<commit_message>
Tweaked the documentation per Lucas comments
</commit_message>
<xml_diff>
--- a/docs/img/title.pptx
+++ b/docs/img/title.pptx
@@ -3699,15 +3699,13 @@
         </p:nvSpPr>
         <p:spPr bwMode="auto">
           <a:xfrm>
-            <a:off x="80470" y="2024270"/>
-            <a:ext cx="2667026" cy="446276"/>
+            <a:off x="67077" y="2053387"/>
+            <a:ext cx="2647288" cy="400110"/>
           </a:xfrm>
           <a:prstGeom prst="rect">
             <a:avLst/>
           </a:prstGeom>
-          <a:solidFill>
-            <a:schemeClr val="bg1"/>
-          </a:solidFill>
+          <a:noFill/>
           <a:ln w="12700">
             <a:noFill/>
             <a:miter lim="800000"/>
@@ -3716,7 +3714,7 @@
           </a:ln>
         </p:spPr>
         <p:txBody>
-          <a:bodyPr wrap="square">
+          <a:bodyPr wrap="square" lIns="0" rIns="0">
             <a:spAutoFit/>
           </a:bodyPr>
           <a:lstStyle/>
@@ -3727,10 +3725,10 @@
               </a:spcBef>
             </a:pPr>
             <a:r>
-              <a:rPr lang="en-US" sz="2300" b="1" dirty="0" smtClean="0"/>
-              <a:t>Space-Time Guess</a:t>
-            </a:r>
-            <a:endParaRPr lang="en-US" sz="2300" b="1" dirty="0"/>
+              <a:rPr lang="en-US" sz="2000" b="1" dirty="0" smtClean="0"/>
+              <a:t>Initial Space-Time Guess</a:t>
+            </a:r>
+            <a:endParaRPr lang="en-US" sz="2000" b="1" dirty="0"/>
           </a:p>
         </p:txBody>
       </p:sp>
@@ -3912,15 +3910,13 @@
         </p:nvSpPr>
         <p:spPr bwMode="auto">
           <a:xfrm>
-            <a:off x="3149036" y="2029899"/>
-            <a:ext cx="2680418" cy="446276"/>
+            <a:off x="3149036" y="2052989"/>
+            <a:ext cx="2680418" cy="400110"/>
           </a:xfrm>
           <a:prstGeom prst="rect">
             <a:avLst/>
           </a:prstGeom>
-          <a:solidFill>
-            <a:schemeClr val="bg1"/>
-          </a:solidFill>
+          <a:noFill/>
           <a:ln w="12700">
             <a:noFill/>
             <a:miter lim="800000"/>
@@ -3940,10 +3936,10 @@
               </a:spcBef>
             </a:pPr>
             <a:r>
-              <a:rPr lang="en-US" sz="2300" b="1" dirty="0" smtClean="0"/>
+              <a:rPr lang="en-US" sz="2000" b="1" dirty="0" smtClean="0"/>
               <a:t>Iterate</a:t>
             </a:r>
-            <a:endParaRPr lang="en-US" sz="2300" dirty="0"/>
+            <a:endParaRPr lang="en-US" sz="2000" dirty="0"/>
           </a:p>
         </p:txBody>
       </p:sp>
@@ -4295,8 +4291,8 @@
         </p:nvSpPr>
         <p:spPr bwMode="auto">
           <a:xfrm flipV="1">
-            <a:off x="2602049" y="2322687"/>
-            <a:ext cx="769576" cy="0"/>
+            <a:off x="2760545" y="2299597"/>
+            <a:ext cx="657260" cy="6974"/>
           </a:xfrm>
           <a:prstGeom prst="line">
             <a:avLst/>
@@ -4548,15 +4544,13 @@
         </p:nvSpPr>
         <p:spPr bwMode="auto">
           <a:xfrm>
-            <a:off x="6173208" y="2038970"/>
-            <a:ext cx="2676445" cy="446276"/>
+            <a:off x="6173208" y="2062060"/>
+            <a:ext cx="2676445" cy="400110"/>
           </a:xfrm>
           <a:prstGeom prst="rect">
             <a:avLst/>
           </a:prstGeom>
-          <a:solidFill>
-            <a:schemeClr val="bg1"/>
-          </a:solidFill>
+          <a:noFill/>
           <a:ln w="12700">
             <a:noFill/>
             <a:miter lim="800000"/>
@@ -4576,14 +4570,14 @@
               </a:spcBef>
             </a:pPr>
             <a:r>
-              <a:rPr lang="en-US" sz="2300" b="1" dirty="0" smtClean="0">
+              <a:rPr lang="en-US" sz="2000" b="1" dirty="0" smtClean="0">
                 <a:solidFill>
                   <a:srgbClr val="000000"/>
                 </a:solidFill>
               </a:rPr>
-              <a:t>Finish</a:t>
-            </a:r>
-            <a:endParaRPr lang="en-US" sz="2300" dirty="0">
+              <a:t>Converge</a:t>
+            </a:r>
+            <a:endParaRPr lang="en-US" sz="2000" dirty="0">
               <a:solidFill>
                 <a:srgbClr val="000000"/>
               </a:solidFill>
@@ -4774,40 +4768,6 @@
                 <a:srgbClr val="000000"/>
               </a:solidFill>
             </a:endParaRPr>
-          </a:p>
-        </p:txBody>
-      </p:sp>
-      <p:sp>
-        <p:nvSpPr>
-          <p:cNvPr id="127" name="Line 25"/>
-          <p:cNvSpPr>
-            <a:spLocks noChangeShapeType="1"/>
-          </p:cNvSpPr>
-          <p:nvPr/>
-        </p:nvSpPr>
-        <p:spPr bwMode="auto">
-          <a:xfrm flipV="1">
-            <a:off x="5681197" y="2329661"/>
-            <a:ext cx="769576" cy="0"/>
-          </a:xfrm>
-          <a:prstGeom prst="line">
-            <a:avLst/>
-          </a:prstGeom>
-          <a:noFill/>
-          <a:ln w="76200">
-            <a:solidFill>
-              <a:schemeClr val="tx1"/>
-            </a:solidFill>
-            <a:round/>
-            <a:headEnd type="none" w="sm" len="sm"/>
-            <a:tailEnd type="triangle" w="med" len="lg"/>
-          </a:ln>
-        </p:spPr>
-        <p:txBody>
-          <a:bodyPr wrap="none" anchor="ctr"/>
-          <a:lstStyle/>
-          <a:p>
-            <a:endParaRPr lang="en-US" dirty="0"/>
           </a:p>
         </p:txBody>
       </p:sp>
@@ -4982,6 +4942,44 @@
               <a:t>Parallel-in-Time Software</a:t>
             </a:r>
             <a:endParaRPr lang="en-US" sz="2800" dirty="0"/>
+          </a:p>
+        </p:txBody>
+      </p:sp>
+      <p:sp>
+        <p:nvSpPr>
+          <p:cNvPr id="35" name="Line 25"/>
+          <p:cNvSpPr>
+            <a:spLocks noChangeShapeType="1"/>
+          </p:cNvSpPr>
+          <p:nvPr/>
+        </p:nvSpPr>
+        <p:spPr bwMode="auto">
+          <a:xfrm flipV="1">
+            <a:off x="5819737" y="2292623"/>
+            <a:ext cx="657260" cy="6974"/>
+          </a:xfrm>
+          <a:prstGeom prst="line">
+            <a:avLst/>
+          </a:prstGeom>
+          <a:noFill/>
+          <a:ln w="76200">
+            <a:solidFill>
+              <a:schemeClr val="tx1"/>
+            </a:solidFill>
+            <a:round/>
+            <a:headEnd type="none" w="sm" len="sm"/>
+            <a:tailEnd type="triangle" w="med" len="lg"/>
+          </a:ln>
+        </p:spPr>
+        <p:txBody>
+          <a:bodyPr wrap="none" anchor="ctr"/>
+          <a:lstStyle/>
+          <a:p>
+            <a:r>
+              <a:rPr lang="en-US" dirty="0" smtClean="0"/>
+              <a:t> </a:t>
+            </a:r>
+            <a:endParaRPr lang="en-US" dirty="0"/>
           </a:p>
         </p:txBody>
       </p:sp>

</xml_diff>

<commit_message>
Fixed a few documentation errors related to the new name
</commit_message>
<xml_diff>
--- a/docs/img/title.pptx
+++ b/docs/img/title.pptx
@@ -194,7 +194,7 @@
           <a:p>
             <a:fld id="{E188F9CD-06D5-634D-8F9B-4D359D0B651A}" type="datetimeFigureOut">
               <a:rPr lang="en-US" smtClean="0"/>
-              <a:t>8/15/14</a:t>
+              <a:t>8/18/14</a:t>
             </a:fld>
             <a:endParaRPr lang="en-US"/>
           </a:p>
@@ -997,7 +997,7 @@
           <a:p>
             <a:fld id="{0C51A9C6-C325-304C-B61F-765046FB0B72}" type="datetimeFigureOut">
               <a:rPr lang="en-US" smtClean="0"/>
-              <a:t>8/15/14</a:t>
+              <a:t>8/18/14</a:t>
             </a:fld>
             <a:endParaRPr lang="en-US"/>
           </a:p>
@@ -1167,7 +1167,7 @@
           <a:p>
             <a:fld id="{0C51A9C6-C325-304C-B61F-765046FB0B72}" type="datetimeFigureOut">
               <a:rPr lang="en-US" smtClean="0"/>
-              <a:t>8/15/14</a:t>
+              <a:t>8/18/14</a:t>
             </a:fld>
             <a:endParaRPr lang="en-US"/>
           </a:p>
@@ -1347,7 +1347,7 @@
           <a:p>
             <a:fld id="{0C51A9C6-C325-304C-B61F-765046FB0B72}" type="datetimeFigureOut">
               <a:rPr lang="en-US" smtClean="0"/>
-              <a:t>8/15/14</a:t>
+              <a:t>8/18/14</a:t>
             </a:fld>
             <a:endParaRPr lang="en-US"/>
           </a:p>
@@ -1517,7 +1517,7 @@
           <a:p>
             <a:fld id="{0C51A9C6-C325-304C-B61F-765046FB0B72}" type="datetimeFigureOut">
               <a:rPr lang="en-US" smtClean="0"/>
-              <a:t>8/15/14</a:t>
+              <a:t>8/18/14</a:t>
             </a:fld>
             <a:endParaRPr lang="en-US"/>
           </a:p>
@@ -1763,7 +1763,7 @@
           <a:p>
             <a:fld id="{0C51A9C6-C325-304C-B61F-765046FB0B72}" type="datetimeFigureOut">
               <a:rPr lang="en-US" smtClean="0"/>
-              <a:t>8/15/14</a:t>
+              <a:t>8/18/14</a:t>
             </a:fld>
             <a:endParaRPr lang="en-US"/>
           </a:p>
@@ -2051,7 +2051,7 @@
           <a:p>
             <a:fld id="{0C51A9C6-C325-304C-B61F-765046FB0B72}" type="datetimeFigureOut">
               <a:rPr lang="en-US" smtClean="0"/>
-              <a:t>8/15/14</a:t>
+              <a:t>8/18/14</a:t>
             </a:fld>
             <a:endParaRPr lang="en-US"/>
           </a:p>
@@ -2473,7 +2473,7 @@
           <a:p>
             <a:fld id="{0C51A9C6-C325-304C-B61F-765046FB0B72}" type="datetimeFigureOut">
               <a:rPr lang="en-US" smtClean="0"/>
-              <a:t>8/15/14</a:t>
+              <a:t>8/18/14</a:t>
             </a:fld>
             <a:endParaRPr lang="en-US"/>
           </a:p>
@@ -2591,7 +2591,7 @@
           <a:p>
             <a:fld id="{0C51A9C6-C325-304C-B61F-765046FB0B72}" type="datetimeFigureOut">
               <a:rPr lang="en-US" smtClean="0"/>
-              <a:t>8/15/14</a:t>
+              <a:t>8/18/14</a:t>
             </a:fld>
             <a:endParaRPr lang="en-US"/>
           </a:p>
@@ -2686,7 +2686,7 @@
           <a:p>
             <a:fld id="{0C51A9C6-C325-304C-B61F-765046FB0B72}" type="datetimeFigureOut">
               <a:rPr lang="en-US" smtClean="0"/>
-              <a:t>8/15/14</a:t>
+              <a:t>8/18/14</a:t>
             </a:fld>
             <a:endParaRPr lang="en-US"/>
           </a:p>
@@ -2963,7 +2963,7 @@
           <a:p>
             <a:fld id="{0C51A9C6-C325-304C-B61F-765046FB0B72}" type="datetimeFigureOut">
               <a:rPr lang="en-US" smtClean="0"/>
-              <a:t>8/15/14</a:t>
+              <a:t>8/18/14</a:t>
             </a:fld>
             <a:endParaRPr lang="en-US"/>
           </a:p>
@@ -3216,7 +3216,7 @@
           <a:p>
             <a:fld id="{0C51A9C6-C325-304C-B61F-765046FB0B72}" type="datetimeFigureOut">
               <a:rPr lang="en-US" smtClean="0"/>
-              <a:t>8/15/14</a:t>
+              <a:t>8/18/14</a:t>
             </a:fld>
             <a:endParaRPr lang="en-US"/>
           </a:p>
@@ -3429,7 +3429,7 @@
           <a:p>
             <a:fld id="{0C51A9C6-C325-304C-B61F-765046FB0B72}" type="datetimeFigureOut">
               <a:rPr lang="en-US" smtClean="0"/>
-              <a:t>8/15/14</a:t>
+              <a:t>8/18/14</a:t>
             </a:fld>
             <a:endParaRPr lang="en-US"/>
           </a:p>
@@ -7443,8 +7443,8 @@
         </p:nvSpPr>
         <p:spPr>
           <a:xfrm>
-            <a:off x="313225" y="5052429"/>
-            <a:ext cx="4972962" cy="720840"/>
+            <a:off x="313224" y="5052429"/>
+            <a:ext cx="5453989" cy="720840"/>
           </a:xfrm>
           <a:prstGeom prst="rect">
             <a:avLst/>
@@ -7597,13 +7597,13 @@
               <a:buNone/>
             </a:pPr>
             <a:r>
-              <a:rPr lang="en-US" sz="2400" dirty="0" smtClean="0">
+              <a:rPr lang="en-US" sz="2400" b="1" dirty="0" smtClean="0">
                 <a:latin typeface="Palatino"/>
                 <a:cs typeface="Palatino"/>
               </a:rPr>
               <a:t>Time-Braid: Multigrid in Time Solvers</a:t>
             </a:r>
-            <a:endParaRPr lang="en-US" sz="2400" dirty="0">
+            <a:endParaRPr lang="en-US" sz="2400" b="1" dirty="0">
               <a:latin typeface="Palatino"/>
               <a:cs typeface="Palatino"/>
             </a:endParaRPr>
@@ -7620,8 +7620,8 @@
         </p:nvSpPr>
         <p:spPr bwMode="auto">
           <a:xfrm>
-            <a:off x="1221415" y="3917440"/>
-            <a:ext cx="3081561" cy="1015663"/>
+            <a:off x="256019" y="3871672"/>
+            <a:ext cx="5026513" cy="1092607"/>
           </a:xfrm>
           <a:prstGeom prst="rect">
             <a:avLst/>
@@ -7646,13 +7646,13 @@
               </a:spcBef>
             </a:pPr>
             <a:r>
-              <a:rPr lang="en-US" sz="6000" dirty="0" smtClean="0">
+              <a:rPr lang="en-US" sz="6500" dirty="0" smtClean="0">
                 <a:latin typeface="Palatino"/>
                 <a:cs typeface="Palatino"/>
               </a:rPr>
-              <a:t>Braid</a:t>
-            </a:r>
-            <a:endParaRPr lang="en-US" sz="6000" dirty="0">
+              <a:t>   Braid</a:t>
+            </a:r>
+            <a:endParaRPr lang="en-US" sz="6500" dirty="0">
               <a:latin typeface="Palatino"/>
               <a:cs typeface="Palatino"/>
             </a:endParaRPr>
@@ -7661,7 +7661,7 @@
       </p:sp>
       <p:pic>
         <p:nvPicPr>
-          <p:cNvPr id="53" name="Picture 52" descr="latex-image-1.pdf"/>
+          <p:cNvPr id="54" name="Picture 53" descr="latex-image-1.pdf"/>
           <p:cNvPicPr>
             <a:picLocks noChangeAspect="1"/>
           </p:cNvPicPr>
@@ -7681,8 +7681,8 @@
         </p:blipFill>
         <p:spPr>
           <a:xfrm>
-            <a:off x="1396985" y="4350875"/>
-            <a:ext cx="471534" cy="544078"/>
+            <a:off x="1614363" y="4312465"/>
+            <a:ext cx="495300" cy="571500"/>
           </a:xfrm>
           <a:prstGeom prst="rect">
             <a:avLst/>

</xml_diff>

<commit_message>
updated the title image a bit to match the title image on the website
</commit_message>
<xml_diff>
--- a/docs/img/title.pptx
+++ b/docs/img/title.pptx
@@ -9,8 +9,8 @@
   </p:notesMasterIdLst>
   <p:sldIdLst>
     <p:sldId id="256" r:id="rId2"/>
-    <p:sldId id="257" r:id="rId3"/>
-    <p:sldId id="258" r:id="rId4"/>
+    <p:sldId id="258" r:id="rId3"/>
+    <p:sldId id="257" r:id="rId4"/>
   </p:sldIdLst>
   <p:sldSz cx="9144000" cy="6858000" type="screen4x3"/>
   <p:notesSz cx="6858000" cy="9144000"/>
@@ -194,7 +194,7 @@
           <a:p>
             <a:fld id="{E188F9CD-06D5-634D-8F9B-4D359D0B651A}" type="datetimeFigureOut">
               <a:rPr lang="en-US" smtClean="0"/>
-              <a:t>8/18/14</a:t>
+              <a:t>10/14/14</a:t>
             </a:fld>
             <a:endParaRPr lang="en-US"/>
           </a:p>
@@ -797,7 +797,7 @@
           <a:p>
             <a:fld id="{8866A22F-1533-9944-BABF-527CE5E65BC8}" type="slidenum">
               <a:rPr lang="en-US" smtClean="0"/>
-              <a:t>2</a:t>
+              <a:t>3</a:t>
             </a:fld>
             <a:endParaRPr lang="en-US"/>
           </a:p>
@@ -997,7 +997,7 @@
           <a:p>
             <a:fld id="{0C51A9C6-C325-304C-B61F-765046FB0B72}" type="datetimeFigureOut">
               <a:rPr lang="en-US" smtClean="0"/>
-              <a:t>8/18/14</a:t>
+              <a:t>10/14/14</a:t>
             </a:fld>
             <a:endParaRPr lang="en-US"/>
           </a:p>
@@ -1167,7 +1167,7 @@
           <a:p>
             <a:fld id="{0C51A9C6-C325-304C-B61F-765046FB0B72}" type="datetimeFigureOut">
               <a:rPr lang="en-US" smtClean="0"/>
-              <a:t>8/18/14</a:t>
+              <a:t>10/14/14</a:t>
             </a:fld>
             <a:endParaRPr lang="en-US"/>
           </a:p>
@@ -1347,7 +1347,7 @@
           <a:p>
             <a:fld id="{0C51A9C6-C325-304C-B61F-765046FB0B72}" type="datetimeFigureOut">
               <a:rPr lang="en-US" smtClean="0"/>
-              <a:t>8/18/14</a:t>
+              <a:t>10/14/14</a:t>
             </a:fld>
             <a:endParaRPr lang="en-US"/>
           </a:p>
@@ -1517,7 +1517,7 @@
           <a:p>
             <a:fld id="{0C51A9C6-C325-304C-B61F-765046FB0B72}" type="datetimeFigureOut">
               <a:rPr lang="en-US" smtClean="0"/>
-              <a:t>8/18/14</a:t>
+              <a:t>10/14/14</a:t>
             </a:fld>
             <a:endParaRPr lang="en-US"/>
           </a:p>
@@ -1763,7 +1763,7 @@
           <a:p>
             <a:fld id="{0C51A9C6-C325-304C-B61F-765046FB0B72}" type="datetimeFigureOut">
               <a:rPr lang="en-US" smtClean="0"/>
-              <a:t>8/18/14</a:t>
+              <a:t>10/14/14</a:t>
             </a:fld>
             <a:endParaRPr lang="en-US"/>
           </a:p>
@@ -2051,7 +2051,7 @@
           <a:p>
             <a:fld id="{0C51A9C6-C325-304C-B61F-765046FB0B72}" type="datetimeFigureOut">
               <a:rPr lang="en-US" smtClean="0"/>
-              <a:t>8/18/14</a:t>
+              <a:t>10/14/14</a:t>
             </a:fld>
             <a:endParaRPr lang="en-US"/>
           </a:p>
@@ -2473,7 +2473,7 @@
           <a:p>
             <a:fld id="{0C51A9C6-C325-304C-B61F-765046FB0B72}" type="datetimeFigureOut">
               <a:rPr lang="en-US" smtClean="0"/>
-              <a:t>8/18/14</a:t>
+              <a:t>10/14/14</a:t>
             </a:fld>
             <a:endParaRPr lang="en-US"/>
           </a:p>
@@ -2591,7 +2591,7 @@
           <a:p>
             <a:fld id="{0C51A9C6-C325-304C-B61F-765046FB0B72}" type="datetimeFigureOut">
               <a:rPr lang="en-US" smtClean="0"/>
-              <a:t>8/18/14</a:t>
+              <a:t>10/14/14</a:t>
             </a:fld>
             <a:endParaRPr lang="en-US"/>
           </a:p>
@@ -2686,7 +2686,7 @@
           <a:p>
             <a:fld id="{0C51A9C6-C325-304C-B61F-765046FB0B72}" type="datetimeFigureOut">
               <a:rPr lang="en-US" smtClean="0"/>
-              <a:t>8/18/14</a:t>
+              <a:t>10/14/14</a:t>
             </a:fld>
             <a:endParaRPr lang="en-US"/>
           </a:p>
@@ -2963,7 +2963,7 @@
           <a:p>
             <a:fld id="{0C51A9C6-C325-304C-B61F-765046FB0B72}" type="datetimeFigureOut">
               <a:rPr lang="en-US" smtClean="0"/>
-              <a:t>8/18/14</a:t>
+              <a:t>10/14/14</a:t>
             </a:fld>
             <a:endParaRPr lang="en-US"/>
           </a:p>
@@ -3216,7 +3216,7 @@
           <a:p>
             <a:fld id="{0C51A9C6-C325-304C-B61F-765046FB0B72}" type="datetimeFigureOut">
               <a:rPr lang="en-US" smtClean="0"/>
-              <a:t>8/18/14</a:t>
+              <a:t>10/14/14</a:t>
             </a:fld>
             <a:endParaRPr lang="en-US"/>
           </a:p>
@@ -3429,7 +3429,7 @@
           <a:p>
             <a:fld id="{0C51A9C6-C325-304C-B61F-765046FB0B72}" type="datetimeFigureOut">
               <a:rPr lang="en-US" smtClean="0"/>
-              <a:t>8/18/14</a:t>
+              <a:t>10/14/14</a:t>
             </a:fld>
             <a:endParaRPr lang="en-US"/>
           </a:p>
@@ -5155,6 +5155,1640 @@
           <a:chExt cx="0" cy="0"/>
         </a:xfrm>
       </p:grpSpPr>
+      <p:pic>
+        <p:nvPicPr>
+          <p:cNvPr id="13" name="Picture 12"/>
+          <p:cNvPicPr>
+            <a:picLocks/>
+          </p:cNvPicPr>
+          <p:nvPr/>
+        </p:nvPicPr>
+        <p:blipFill rotWithShape="1">
+          <a:blip r:embed="rId2">
+            <a:extLst>
+              <a:ext uri="{28A0092B-C50C-407E-A947-70E740481C1C}">
+                <a14:useLocalDpi xmlns:a14="http://schemas.microsoft.com/office/drawing/2010/main" val="0"/>
+              </a:ext>
+            </a:extLst>
+          </a:blip>
+          <a:srcRect l="1953" t="21056" r="1801" b="10228"/>
+          <a:stretch/>
+        </p:blipFill>
+        <p:spPr>
+          <a:xfrm>
+            <a:off x="240261" y="2643910"/>
+            <a:ext cx="2474106" cy="1239924"/>
+          </a:xfrm>
+          <a:prstGeom prst="rect">
+            <a:avLst/>
+          </a:prstGeom>
+        </p:spPr>
+      </p:pic>
+      <p:sp>
+        <p:nvSpPr>
+          <p:cNvPr id="14" name="Freeform 6"/>
+          <p:cNvSpPr>
+            <a:spLocks/>
+          </p:cNvSpPr>
+          <p:nvPr/>
+        </p:nvSpPr>
+        <p:spPr bwMode="auto">
+          <a:xfrm>
+            <a:off x="1742400" y="3574631"/>
+            <a:ext cx="13188" cy="13374"/>
+          </a:xfrm>
+          <a:custGeom>
+            <a:avLst/>
+            <a:gdLst>
+              <a:gd name="T0" fmla="*/ 0 w 17"/>
+              <a:gd name="T1" fmla="*/ 0 h 17"/>
+              <a:gd name="T2" fmla="*/ 2147483647 w 17"/>
+              <a:gd name="T3" fmla="*/ 0 h 17"/>
+              <a:gd name="T4" fmla="*/ 2147483647 w 17"/>
+              <a:gd name="T5" fmla="*/ 2147483647 h 17"/>
+              <a:gd name="T6" fmla="*/ 0 w 17"/>
+              <a:gd name="T7" fmla="*/ 2147483647 h 17"/>
+              <a:gd name="T8" fmla="*/ 0 w 17"/>
+              <a:gd name="T9" fmla="*/ 0 h 17"/>
+              <a:gd name="T10" fmla="*/ 0 60000 65536"/>
+              <a:gd name="T11" fmla="*/ 0 60000 65536"/>
+              <a:gd name="T12" fmla="*/ 0 60000 65536"/>
+              <a:gd name="T13" fmla="*/ 0 60000 65536"/>
+              <a:gd name="T14" fmla="*/ 0 60000 65536"/>
+              <a:gd name="T15" fmla="*/ 0 w 17"/>
+              <a:gd name="T16" fmla="*/ 0 h 17"/>
+              <a:gd name="T17" fmla="*/ 17 w 17"/>
+              <a:gd name="T18" fmla="*/ 17 h 17"/>
+            </a:gdLst>
+            <a:ahLst/>
+            <a:cxnLst>
+              <a:cxn ang="T10">
+                <a:pos x="T0" y="T1"/>
+              </a:cxn>
+              <a:cxn ang="T11">
+                <a:pos x="T2" y="T3"/>
+              </a:cxn>
+              <a:cxn ang="T12">
+                <a:pos x="T4" y="T5"/>
+              </a:cxn>
+              <a:cxn ang="T13">
+                <a:pos x="T6" y="T7"/>
+              </a:cxn>
+              <a:cxn ang="T14">
+                <a:pos x="T8" y="T9"/>
+              </a:cxn>
+            </a:cxnLst>
+            <a:rect l="T15" t="T16" r="T17" b="T18"/>
+            <a:pathLst>
+              <a:path w="17" h="17">
+                <a:moveTo>
+                  <a:pt x="0" y="0"/>
+                </a:moveTo>
+                <a:lnTo>
+                  <a:pt x="16" y="0"/>
+                </a:lnTo>
+                <a:lnTo>
+                  <a:pt x="16" y="16"/>
+                </a:lnTo>
+                <a:lnTo>
+                  <a:pt x="0" y="16"/>
+                </a:lnTo>
+                <a:lnTo>
+                  <a:pt x="0" y="0"/>
+                </a:lnTo>
+              </a:path>
+            </a:pathLst>
+          </a:custGeom>
+          <a:solidFill>
+            <a:srgbClr val="FFFFFF"/>
+          </a:solidFill>
+          <a:ln w="9525" cap="rnd">
+            <a:noFill/>
+            <a:round/>
+            <a:headEnd type="none" w="sm" len="sm"/>
+            <a:tailEnd type="none" w="sm" len="sm"/>
+          </a:ln>
+        </p:spPr>
+        <p:txBody>
+          <a:bodyPr lIns="91440" tIns="45720" rIns="91440" bIns="45720"/>
+          <a:lstStyle/>
+          <a:p>
+            <a:endParaRPr lang="en-US" dirty="0"/>
+          </a:p>
+        </p:txBody>
+      </p:sp>
+      <p:sp>
+        <p:nvSpPr>
+          <p:cNvPr id="15" name="Text Box 30"/>
+          <p:cNvSpPr txBox="1">
+            <a:spLocks noChangeArrowheads="1"/>
+          </p:cNvSpPr>
+          <p:nvPr/>
+        </p:nvSpPr>
+        <p:spPr bwMode="auto">
+          <a:xfrm>
+            <a:off x="45910" y="1940499"/>
+            <a:ext cx="2647288" cy="400110"/>
+          </a:xfrm>
+          <a:prstGeom prst="rect">
+            <a:avLst/>
+          </a:prstGeom>
+          <a:noFill/>
+          <a:ln w="12700">
+            <a:noFill/>
+            <a:miter lim="800000"/>
+            <a:headEnd type="none" w="sm" len="sm"/>
+            <a:tailEnd type="none" w="sm" len="sm"/>
+          </a:ln>
+        </p:spPr>
+        <p:txBody>
+          <a:bodyPr wrap="square" lIns="0" tIns="45720" rIns="0" bIns="45720">
+            <a:spAutoFit/>
+          </a:bodyPr>
+          <a:lstStyle/>
+          <a:p>
+            <a:pPr algn="ctr">
+              <a:spcBef>
+                <a:spcPct val="0"/>
+              </a:spcBef>
+            </a:pPr>
+            <a:r>
+              <a:rPr lang="en-US" sz="2000" b="1" dirty="0"/>
+              <a:t>Initial Space-Time Guess</a:t>
+            </a:r>
+          </a:p>
+        </p:txBody>
+      </p:sp>
+      <p:sp>
+        <p:nvSpPr>
+          <p:cNvPr id="17" name="TextBox 16"/>
+          <p:cNvSpPr txBox="1"/>
+          <p:nvPr/>
+        </p:nvSpPr>
+        <p:spPr>
+          <a:xfrm rot="16993905">
+            <a:off x="-125383" y="3157976"/>
+            <a:ext cx="649374" cy="369332"/>
+          </a:xfrm>
+          <a:prstGeom prst="rect">
+            <a:avLst/>
+          </a:prstGeom>
+          <a:noFill/>
+        </p:spPr>
+        <p:txBody>
+          <a:bodyPr wrap="none" lIns="91440" tIns="45720" rIns="91440" bIns="45720" rtlCol="0">
+            <a:spAutoFit/>
+          </a:bodyPr>
+          <a:lstStyle/>
+          <a:p>
+            <a:r>
+              <a:rPr lang="en-US" sz="1800" dirty="0">
+                <a:solidFill>
+                  <a:srgbClr val="000000"/>
+                </a:solidFill>
+              </a:rPr>
+              <a:t>Time</a:t>
+            </a:r>
+          </a:p>
+        </p:txBody>
+      </p:sp>
+      <p:sp>
+        <p:nvSpPr>
+          <p:cNvPr id="18" name="TextBox 17"/>
+          <p:cNvSpPr txBox="1"/>
+          <p:nvPr/>
+        </p:nvSpPr>
+        <p:spPr>
+          <a:xfrm rot="20878399">
+            <a:off x="1063475" y="3559046"/>
+            <a:ext cx="735034" cy="369332"/>
+          </a:xfrm>
+          <a:prstGeom prst="rect">
+            <a:avLst/>
+          </a:prstGeom>
+          <a:noFill/>
+        </p:spPr>
+        <p:txBody>
+          <a:bodyPr wrap="none" lIns="91440" tIns="45720" rIns="91440" bIns="45720" rtlCol="0">
+            <a:spAutoFit/>
+          </a:bodyPr>
+          <a:lstStyle/>
+          <a:p>
+            <a:r>
+              <a:rPr lang="en-US" sz="1800" dirty="0">
+                <a:solidFill>
+                  <a:srgbClr val="000000"/>
+                </a:solidFill>
+              </a:rPr>
+              <a:t>Space</a:t>
+            </a:r>
+          </a:p>
+        </p:txBody>
+      </p:sp>
+      <p:sp>
+        <p:nvSpPr>
+          <p:cNvPr id="19" name="Line 25"/>
+          <p:cNvSpPr>
+            <a:spLocks noChangeShapeType="1"/>
+          </p:cNvSpPr>
+          <p:nvPr/>
+        </p:nvSpPr>
+        <p:spPr bwMode="auto">
+          <a:xfrm flipV="1">
+            <a:off x="304239" y="2656111"/>
+            <a:ext cx="122166" cy="407474"/>
+          </a:xfrm>
+          <a:prstGeom prst="line">
+            <a:avLst/>
+          </a:prstGeom>
+          <a:noFill/>
+          <a:ln w="28575">
+            <a:solidFill>
+              <a:schemeClr val="tx1"/>
+            </a:solidFill>
+            <a:round/>
+            <a:headEnd type="none" w="sm" len="sm"/>
+            <a:tailEnd type="triangle" w="med" len="lg"/>
+          </a:ln>
+        </p:spPr>
+        <p:txBody>
+          <a:bodyPr wrap="none" lIns="91440" tIns="45720" rIns="91440" bIns="45720" anchor="ctr"/>
+          <a:lstStyle/>
+          <a:p>
+            <a:endParaRPr lang="en-US" dirty="0"/>
+          </a:p>
+        </p:txBody>
+      </p:sp>
+      <p:sp>
+        <p:nvSpPr>
+          <p:cNvPr id="20" name="Line 25"/>
+          <p:cNvSpPr>
+            <a:spLocks noChangeShapeType="1"/>
+          </p:cNvSpPr>
+          <p:nvPr/>
+        </p:nvSpPr>
+        <p:spPr bwMode="auto">
+          <a:xfrm flipV="1">
+            <a:off x="1854247" y="3539101"/>
+            <a:ext cx="515662" cy="145446"/>
+          </a:xfrm>
+          <a:prstGeom prst="line">
+            <a:avLst/>
+          </a:prstGeom>
+          <a:noFill/>
+          <a:ln w="28575">
+            <a:solidFill>
+              <a:schemeClr val="tx1"/>
+            </a:solidFill>
+            <a:round/>
+            <a:headEnd type="none" w="sm" len="sm"/>
+            <a:tailEnd type="triangle" w="med" len="lg"/>
+          </a:ln>
+        </p:spPr>
+        <p:txBody>
+          <a:bodyPr wrap="none" lIns="91440" tIns="45720" rIns="91440" bIns="45720" anchor="ctr"/>
+          <a:lstStyle/>
+          <a:p>
+            <a:endParaRPr lang="en-US" dirty="0"/>
+          </a:p>
+        </p:txBody>
+      </p:sp>
+      <p:sp>
+        <p:nvSpPr>
+          <p:cNvPr id="22" name="Freeform 6"/>
+          <p:cNvSpPr>
+            <a:spLocks/>
+          </p:cNvSpPr>
+          <p:nvPr/>
+        </p:nvSpPr>
+        <p:spPr bwMode="auto">
+          <a:xfrm>
+            <a:off x="4535062" y="3597539"/>
+            <a:ext cx="13188" cy="13374"/>
+          </a:xfrm>
+          <a:custGeom>
+            <a:avLst/>
+            <a:gdLst>
+              <a:gd name="T0" fmla="*/ 0 w 17"/>
+              <a:gd name="T1" fmla="*/ 0 h 17"/>
+              <a:gd name="T2" fmla="*/ 2147483647 w 17"/>
+              <a:gd name="T3" fmla="*/ 0 h 17"/>
+              <a:gd name="T4" fmla="*/ 2147483647 w 17"/>
+              <a:gd name="T5" fmla="*/ 2147483647 h 17"/>
+              <a:gd name="T6" fmla="*/ 0 w 17"/>
+              <a:gd name="T7" fmla="*/ 2147483647 h 17"/>
+              <a:gd name="T8" fmla="*/ 0 w 17"/>
+              <a:gd name="T9" fmla="*/ 0 h 17"/>
+              <a:gd name="T10" fmla="*/ 0 60000 65536"/>
+              <a:gd name="T11" fmla="*/ 0 60000 65536"/>
+              <a:gd name="T12" fmla="*/ 0 60000 65536"/>
+              <a:gd name="T13" fmla="*/ 0 60000 65536"/>
+              <a:gd name="T14" fmla="*/ 0 60000 65536"/>
+              <a:gd name="T15" fmla="*/ 0 w 17"/>
+              <a:gd name="T16" fmla="*/ 0 h 17"/>
+              <a:gd name="T17" fmla="*/ 17 w 17"/>
+              <a:gd name="T18" fmla="*/ 17 h 17"/>
+            </a:gdLst>
+            <a:ahLst/>
+            <a:cxnLst>
+              <a:cxn ang="T10">
+                <a:pos x="T0" y="T1"/>
+              </a:cxn>
+              <a:cxn ang="T11">
+                <a:pos x="T2" y="T3"/>
+              </a:cxn>
+              <a:cxn ang="T12">
+                <a:pos x="T4" y="T5"/>
+              </a:cxn>
+              <a:cxn ang="T13">
+                <a:pos x="T6" y="T7"/>
+              </a:cxn>
+              <a:cxn ang="T14">
+                <a:pos x="T8" y="T9"/>
+              </a:cxn>
+            </a:cxnLst>
+            <a:rect l="T15" t="T16" r="T17" b="T18"/>
+            <a:pathLst>
+              <a:path w="17" h="17">
+                <a:moveTo>
+                  <a:pt x="0" y="0"/>
+                </a:moveTo>
+                <a:lnTo>
+                  <a:pt x="16" y="0"/>
+                </a:lnTo>
+                <a:lnTo>
+                  <a:pt x="16" y="16"/>
+                </a:lnTo>
+                <a:lnTo>
+                  <a:pt x="0" y="16"/>
+                </a:lnTo>
+                <a:lnTo>
+                  <a:pt x="0" y="0"/>
+                </a:lnTo>
+              </a:path>
+            </a:pathLst>
+          </a:custGeom>
+          <a:solidFill>
+            <a:srgbClr val="FFFFFF"/>
+          </a:solidFill>
+          <a:ln w="9525" cap="rnd">
+            <a:noFill/>
+            <a:round/>
+            <a:headEnd type="none" w="sm" len="sm"/>
+            <a:tailEnd type="none" w="sm" len="sm"/>
+          </a:ln>
+        </p:spPr>
+        <p:txBody>
+          <a:bodyPr lIns="91440" tIns="45720" rIns="91440" bIns="45720"/>
+          <a:lstStyle/>
+          <a:p>
+            <a:endParaRPr lang="en-US" dirty="0"/>
+          </a:p>
+        </p:txBody>
+      </p:sp>
+      <p:pic>
+        <p:nvPicPr>
+          <p:cNvPr id="23" name="Picture 22"/>
+          <p:cNvPicPr>
+            <a:picLocks noChangeAspect="1"/>
+          </p:cNvPicPr>
+          <p:nvPr/>
+        </p:nvPicPr>
+        <p:blipFill rotWithShape="1">
+          <a:blip r:embed="rId3">
+            <a:extLst>
+              <a:ext uri="{28A0092B-C50C-407E-A947-70E740481C1C}">
+                <a14:useLocalDpi xmlns:a14="http://schemas.microsoft.com/office/drawing/2010/main" val="0"/>
+              </a:ext>
+            </a:extLst>
+          </a:blip>
+          <a:srcRect t="25450" b="9267"/>
+          <a:stretch/>
+        </p:blipFill>
+        <p:spPr>
+          <a:xfrm>
+            <a:off x="3046390" y="2752936"/>
+            <a:ext cx="2515412" cy="1156200"/>
+          </a:xfrm>
+          <a:prstGeom prst="rect">
+            <a:avLst/>
+          </a:prstGeom>
+        </p:spPr>
+      </p:pic>
+      <p:sp>
+        <p:nvSpPr>
+          <p:cNvPr id="25" name="TextBox 24"/>
+          <p:cNvSpPr txBox="1"/>
+          <p:nvPr/>
+        </p:nvSpPr>
+        <p:spPr>
+          <a:xfrm rot="16993905">
+            <a:off x="2691525" y="3487980"/>
+            <a:ext cx="649374" cy="369332"/>
+          </a:xfrm>
+          <a:prstGeom prst="rect">
+            <a:avLst/>
+          </a:prstGeom>
+          <a:noFill/>
+        </p:spPr>
+        <p:txBody>
+          <a:bodyPr wrap="none" lIns="91440" tIns="45720" rIns="91440" bIns="45720" rtlCol="0">
+            <a:spAutoFit/>
+          </a:bodyPr>
+          <a:lstStyle/>
+          <a:p>
+            <a:r>
+              <a:rPr lang="en-US" sz="1800" dirty="0">
+                <a:solidFill>
+                  <a:srgbClr val="000000"/>
+                </a:solidFill>
+              </a:rPr>
+              <a:t>Time</a:t>
+            </a:r>
+          </a:p>
+        </p:txBody>
+      </p:sp>
+      <p:sp>
+        <p:nvSpPr>
+          <p:cNvPr id="26" name="TextBox 25"/>
+          <p:cNvSpPr txBox="1"/>
+          <p:nvPr/>
+        </p:nvSpPr>
+        <p:spPr>
+          <a:xfrm rot="20878399">
+            <a:off x="3847067" y="3572882"/>
+            <a:ext cx="735034" cy="369332"/>
+          </a:xfrm>
+          <a:prstGeom prst="rect">
+            <a:avLst/>
+          </a:prstGeom>
+          <a:noFill/>
+        </p:spPr>
+        <p:txBody>
+          <a:bodyPr wrap="none" lIns="91440" tIns="45720" rIns="91440" bIns="45720" rtlCol="0">
+            <a:spAutoFit/>
+          </a:bodyPr>
+          <a:lstStyle/>
+          <a:p>
+            <a:r>
+              <a:rPr lang="en-US" sz="1800" dirty="0">
+                <a:solidFill>
+                  <a:srgbClr val="000000"/>
+                </a:solidFill>
+              </a:rPr>
+              <a:t>Space</a:t>
+            </a:r>
+          </a:p>
+        </p:txBody>
+      </p:sp>
+      <p:sp>
+        <p:nvSpPr>
+          <p:cNvPr id="27" name="Line 25"/>
+          <p:cNvSpPr>
+            <a:spLocks noChangeShapeType="1"/>
+          </p:cNvSpPr>
+          <p:nvPr/>
+        </p:nvSpPr>
+        <p:spPr bwMode="auto">
+          <a:xfrm flipV="1">
+            <a:off x="3131537" y="2986243"/>
+            <a:ext cx="122166" cy="407474"/>
+          </a:xfrm>
+          <a:prstGeom prst="line">
+            <a:avLst/>
+          </a:prstGeom>
+          <a:noFill/>
+          <a:ln w="28575">
+            <a:solidFill>
+              <a:schemeClr val="tx1"/>
+            </a:solidFill>
+            <a:round/>
+            <a:headEnd type="none" w="sm" len="sm"/>
+            <a:tailEnd type="triangle" w="med" len="lg"/>
+          </a:ln>
+        </p:spPr>
+        <p:txBody>
+          <a:bodyPr wrap="none" lIns="91440" tIns="45720" rIns="91440" bIns="45720" anchor="ctr"/>
+          <a:lstStyle/>
+          <a:p>
+            <a:endParaRPr lang="en-US" dirty="0"/>
+          </a:p>
+        </p:txBody>
+      </p:sp>
+      <p:sp>
+        <p:nvSpPr>
+          <p:cNvPr id="28" name="Line 25"/>
+          <p:cNvSpPr>
+            <a:spLocks noChangeShapeType="1"/>
+          </p:cNvSpPr>
+          <p:nvPr/>
+        </p:nvSpPr>
+        <p:spPr bwMode="auto">
+          <a:xfrm flipV="1">
+            <a:off x="4625741" y="3554951"/>
+            <a:ext cx="515662" cy="145446"/>
+          </a:xfrm>
+          <a:prstGeom prst="line">
+            <a:avLst/>
+          </a:prstGeom>
+          <a:noFill/>
+          <a:ln w="28575">
+            <a:solidFill>
+              <a:schemeClr val="tx1"/>
+            </a:solidFill>
+            <a:round/>
+            <a:headEnd type="none" w="sm" len="sm"/>
+            <a:tailEnd type="triangle" w="med" len="lg"/>
+          </a:ln>
+        </p:spPr>
+        <p:txBody>
+          <a:bodyPr wrap="none" lIns="91440" tIns="45720" rIns="91440" bIns="45720" anchor="ctr"/>
+          <a:lstStyle/>
+          <a:p>
+            <a:endParaRPr lang="en-US" dirty="0"/>
+          </a:p>
+        </p:txBody>
+      </p:sp>
+      <p:sp>
+        <p:nvSpPr>
+          <p:cNvPr id="29" name="Rounded Rectangle 28"/>
+          <p:cNvSpPr/>
+          <p:nvPr/>
+        </p:nvSpPr>
+        <p:spPr bwMode="auto">
+          <a:xfrm>
+            <a:off x="6490878" y="4641397"/>
+            <a:ext cx="1349456" cy="596902"/>
+          </a:xfrm>
+          <a:prstGeom prst="roundRect">
+            <a:avLst/>
+          </a:prstGeom>
+          <a:solidFill>
+            <a:schemeClr val="bg1">
+              <a:alpha val="50000"/>
+            </a:schemeClr>
+          </a:solidFill>
+          <a:ln w="9525">
+            <a:noFill/>
+            <a:miter lim="800000"/>
+            <a:headEnd/>
+            <a:tailEnd/>
+          </a:ln>
+          <a:effectLst/>
+        </p:spPr>
+        <p:txBody>
+          <a:bodyPr lIns="91440" tIns="45720" rIns="91440" bIns="45720" rtlCol="0" anchor="b">
+            <a:prstTxWarp prst="textNoShape">
+              <a:avLst/>
+            </a:prstTxWarp>
+          </a:bodyPr>
+          <a:lstStyle/>
+          <a:p>
+            <a:pPr algn="ctr">
+              <a:spcBef>
+                <a:spcPct val="0"/>
+              </a:spcBef>
+            </a:pPr>
+            <a:endParaRPr lang="en-US" sz="1600" dirty="0">
+              <a:solidFill>
+                <a:srgbClr val="000000"/>
+              </a:solidFill>
+            </a:endParaRPr>
+          </a:p>
+        </p:txBody>
+      </p:sp>
+      <p:pic>
+        <p:nvPicPr>
+          <p:cNvPr id="31" name="Picture 30"/>
+          <p:cNvPicPr>
+            <a:picLocks/>
+          </p:cNvPicPr>
+          <p:nvPr/>
+        </p:nvPicPr>
+        <p:blipFill rotWithShape="1">
+          <a:blip r:embed="rId4">
+            <a:extLst>
+              <a:ext uri="{28A0092B-C50C-407E-A947-70E740481C1C}">
+                <a14:useLocalDpi xmlns:a14="http://schemas.microsoft.com/office/drawing/2010/main" val="0"/>
+              </a:ext>
+            </a:extLst>
+          </a:blip>
+          <a:srcRect l="4030" t="26640" r="2632" b="9500"/>
+          <a:stretch/>
+        </p:blipFill>
+        <p:spPr>
+          <a:xfrm>
+            <a:off x="5850543" y="2781274"/>
+            <a:ext cx="2399354" cy="1152300"/>
+          </a:xfrm>
+          <a:prstGeom prst="rect">
+            <a:avLst/>
+          </a:prstGeom>
+        </p:spPr>
+      </p:pic>
+      <p:sp>
+        <p:nvSpPr>
+          <p:cNvPr id="32" name="Freeform 6"/>
+          <p:cNvSpPr>
+            <a:spLocks/>
+          </p:cNvSpPr>
+          <p:nvPr/>
+        </p:nvSpPr>
+        <p:spPr bwMode="auto">
+          <a:xfrm>
+            <a:off x="7248772" y="3596539"/>
+            <a:ext cx="13188" cy="13374"/>
+          </a:xfrm>
+          <a:custGeom>
+            <a:avLst/>
+            <a:gdLst>
+              <a:gd name="T0" fmla="*/ 0 w 17"/>
+              <a:gd name="T1" fmla="*/ 0 h 17"/>
+              <a:gd name="T2" fmla="*/ 2147483647 w 17"/>
+              <a:gd name="T3" fmla="*/ 0 h 17"/>
+              <a:gd name="T4" fmla="*/ 2147483647 w 17"/>
+              <a:gd name="T5" fmla="*/ 2147483647 h 17"/>
+              <a:gd name="T6" fmla="*/ 0 w 17"/>
+              <a:gd name="T7" fmla="*/ 2147483647 h 17"/>
+              <a:gd name="T8" fmla="*/ 0 w 17"/>
+              <a:gd name="T9" fmla="*/ 0 h 17"/>
+              <a:gd name="T10" fmla="*/ 0 60000 65536"/>
+              <a:gd name="T11" fmla="*/ 0 60000 65536"/>
+              <a:gd name="T12" fmla="*/ 0 60000 65536"/>
+              <a:gd name="T13" fmla="*/ 0 60000 65536"/>
+              <a:gd name="T14" fmla="*/ 0 60000 65536"/>
+              <a:gd name="T15" fmla="*/ 0 w 17"/>
+              <a:gd name="T16" fmla="*/ 0 h 17"/>
+              <a:gd name="T17" fmla="*/ 17 w 17"/>
+              <a:gd name="T18" fmla="*/ 17 h 17"/>
+            </a:gdLst>
+            <a:ahLst/>
+            <a:cxnLst>
+              <a:cxn ang="T10">
+                <a:pos x="T0" y="T1"/>
+              </a:cxn>
+              <a:cxn ang="T11">
+                <a:pos x="T2" y="T3"/>
+              </a:cxn>
+              <a:cxn ang="T12">
+                <a:pos x="T4" y="T5"/>
+              </a:cxn>
+              <a:cxn ang="T13">
+                <a:pos x="T6" y="T7"/>
+              </a:cxn>
+              <a:cxn ang="T14">
+                <a:pos x="T8" y="T9"/>
+              </a:cxn>
+            </a:cxnLst>
+            <a:rect l="T15" t="T16" r="T17" b="T18"/>
+            <a:pathLst>
+              <a:path w="17" h="17">
+                <a:moveTo>
+                  <a:pt x="0" y="0"/>
+                </a:moveTo>
+                <a:lnTo>
+                  <a:pt x="16" y="0"/>
+                </a:lnTo>
+                <a:lnTo>
+                  <a:pt x="16" y="16"/>
+                </a:lnTo>
+                <a:lnTo>
+                  <a:pt x="0" y="16"/>
+                </a:lnTo>
+                <a:lnTo>
+                  <a:pt x="0" y="0"/>
+                </a:lnTo>
+              </a:path>
+            </a:pathLst>
+          </a:custGeom>
+          <a:solidFill>
+            <a:srgbClr val="FFFFFF"/>
+          </a:solidFill>
+          <a:ln w="9525" cap="rnd">
+            <a:noFill/>
+            <a:round/>
+            <a:headEnd type="none" w="sm" len="sm"/>
+            <a:tailEnd type="none" w="sm" len="sm"/>
+          </a:ln>
+        </p:spPr>
+        <p:txBody>
+          <a:bodyPr lIns="91440" tIns="45720" rIns="91440" bIns="45720"/>
+          <a:lstStyle/>
+          <a:p>
+            <a:endParaRPr lang="en-US" dirty="0"/>
+          </a:p>
+        </p:txBody>
+      </p:sp>
+      <p:sp>
+        <p:nvSpPr>
+          <p:cNvPr id="33" name="Freeform 17"/>
+          <p:cNvSpPr>
+            <a:spLocks/>
+          </p:cNvSpPr>
+          <p:nvPr/>
+        </p:nvSpPr>
+        <p:spPr bwMode="auto">
+          <a:xfrm>
+            <a:off x="7695005" y="4793371"/>
+            <a:ext cx="12246" cy="13374"/>
+          </a:xfrm>
+          <a:custGeom>
+            <a:avLst/>
+            <a:gdLst>
+              <a:gd name="T0" fmla="*/ 0 w 17"/>
+              <a:gd name="T1" fmla="*/ 0 h 17"/>
+              <a:gd name="T2" fmla="*/ 2147483647 w 17"/>
+              <a:gd name="T3" fmla="*/ 0 h 17"/>
+              <a:gd name="T4" fmla="*/ 2147483647 w 17"/>
+              <a:gd name="T5" fmla="*/ 2147483647 h 17"/>
+              <a:gd name="T6" fmla="*/ 0 w 17"/>
+              <a:gd name="T7" fmla="*/ 2147483647 h 17"/>
+              <a:gd name="T8" fmla="*/ 0 w 17"/>
+              <a:gd name="T9" fmla="*/ 0 h 17"/>
+              <a:gd name="T10" fmla="*/ 0 60000 65536"/>
+              <a:gd name="T11" fmla="*/ 0 60000 65536"/>
+              <a:gd name="T12" fmla="*/ 0 60000 65536"/>
+              <a:gd name="T13" fmla="*/ 0 60000 65536"/>
+              <a:gd name="T14" fmla="*/ 0 60000 65536"/>
+              <a:gd name="T15" fmla="*/ 0 w 17"/>
+              <a:gd name="T16" fmla="*/ 0 h 17"/>
+              <a:gd name="T17" fmla="*/ 17 w 17"/>
+              <a:gd name="T18" fmla="*/ 17 h 17"/>
+            </a:gdLst>
+            <a:ahLst/>
+            <a:cxnLst>
+              <a:cxn ang="T10">
+                <a:pos x="T0" y="T1"/>
+              </a:cxn>
+              <a:cxn ang="T11">
+                <a:pos x="T2" y="T3"/>
+              </a:cxn>
+              <a:cxn ang="T12">
+                <a:pos x="T4" y="T5"/>
+              </a:cxn>
+              <a:cxn ang="T13">
+                <a:pos x="T6" y="T7"/>
+              </a:cxn>
+              <a:cxn ang="T14">
+                <a:pos x="T8" y="T9"/>
+              </a:cxn>
+            </a:cxnLst>
+            <a:rect l="T15" t="T16" r="T17" b="T18"/>
+            <a:pathLst>
+              <a:path w="17" h="17">
+                <a:moveTo>
+                  <a:pt x="0" y="0"/>
+                </a:moveTo>
+                <a:lnTo>
+                  <a:pt x="16" y="0"/>
+                </a:lnTo>
+                <a:lnTo>
+                  <a:pt x="16" y="16"/>
+                </a:lnTo>
+                <a:lnTo>
+                  <a:pt x="0" y="16"/>
+                </a:lnTo>
+                <a:lnTo>
+                  <a:pt x="0" y="0"/>
+                </a:lnTo>
+              </a:path>
+            </a:pathLst>
+          </a:custGeom>
+          <a:solidFill>
+            <a:srgbClr val="FFFFFF"/>
+          </a:solidFill>
+          <a:ln w="9525" cap="rnd">
+            <a:noFill/>
+            <a:round/>
+            <a:headEnd type="none" w="sm" len="sm"/>
+            <a:tailEnd type="none" w="sm" len="sm"/>
+          </a:ln>
+        </p:spPr>
+        <p:txBody>
+          <a:bodyPr lIns="91440" tIns="45720" rIns="91440" bIns="45720"/>
+          <a:lstStyle/>
+          <a:p>
+            <a:endParaRPr lang="en-US" dirty="0"/>
+          </a:p>
+        </p:txBody>
+      </p:sp>
+      <p:sp>
+        <p:nvSpPr>
+          <p:cNvPr id="34" name="Text Box 30"/>
+          <p:cNvSpPr txBox="1">
+            <a:spLocks noChangeArrowheads="1"/>
+          </p:cNvSpPr>
+          <p:nvPr/>
+        </p:nvSpPr>
+        <p:spPr bwMode="auto">
+          <a:xfrm>
+            <a:off x="5587563" y="1942115"/>
+            <a:ext cx="2676446" cy="400110"/>
+          </a:xfrm>
+          <a:prstGeom prst="rect">
+            <a:avLst/>
+          </a:prstGeom>
+          <a:noFill/>
+          <a:ln w="12700">
+            <a:noFill/>
+            <a:miter lim="800000"/>
+            <a:headEnd type="none" w="sm" len="sm"/>
+            <a:tailEnd type="none" w="sm" len="sm"/>
+          </a:ln>
+        </p:spPr>
+        <p:txBody>
+          <a:bodyPr wrap="square" lIns="91440" tIns="45720" rIns="91440" bIns="45720">
+            <a:spAutoFit/>
+          </a:bodyPr>
+          <a:lstStyle/>
+          <a:p>
+            <a:pPr algn="ctr">
+              <a:spcBef>
+                <a:spcPct val="0"/>
+              </a:spcBef>
+            </a:pPr>
+            <a:r>
+              <a:rPr lang="en-US" sz="2000" b="1" dirty="0">
+                <a:solidFill>
+                  <a:srgbClr val="000000"/>
+                </a:solidFill>
+              </a:rPr>
+              <a:t>Converge</a:t>
+            </a:r>
+            <a:endParaRPr lang="en-US" sz="2000" dirty="0">
+              <a:solidFill>
+                <a:srgbClr val="000000"/>
+              </a:solidFill>
+            </a:endParaRPr>
+          </a:p>
+        </p:txBody>
+      </p:sp>
+      <p:sp>
+        <p:nvSpPr>
+          <p:cNvPr id="36" name="TextBox 35"/>
+          <p:cNvSpPr txBox="1"/>
+          <p:nvPr/>
+        </p:nvSpPr>
+        <p:spPr>
+          <a:xfrm rot="16993905">
+            <a:off x="5405233" y="3486978"/>
+            <a:ext cx="649374" cy="369332"/>
+          </a:xfrm>
+          <a:prstGeom prst="rect">
+            <a:avLst/>
+          </a:prstGeom>
+          <a:noFill/>
+        </p:spPr>
+        <p:txBody>
+          <a:bodyPr wrap="none" lIns="91440" tIns="45720" rIns="91440" bIns="45720" rtlCol="0">
+            <a:spAutoFit/>
+          </a:bodyPr>
+          <a:lstStyle/>
+          <a:p>
+            <a:r>
+              <a:rPr lang="en-US" sz="1800" dirty="0">
+                <a:solidFill>
+                  <a:srgbClr val="000000"/>
+                </a:solidFill>
+              </a:rPr>
+              <a:t>Time</a:t>
+            </a:r>
+          </a:p>
+        </p:txBody>
+      </p:sp>
+      <p:sp>
+        <p:nvSpPr>
+          <p:cNvPr id="37" name="TextBox 36"/>
+          <p:cNvSpPr txBox="1"/>
+          <p:nvPr/>
+        </p:nvSpPr>
+        <p:spPr>
+          <a:xfrm rot="20878399">
+            <a:off x="6560775" y="3571884"/>
+            <a:ext cx="735034" cy="369332"/>
+          </a:xfrm>
+          <a:prstGeom prst="rect">
+            <a:avLst/>
+          </a:prstGeom>
+          <a:noFill/>
+        </p:spPr>
+        <p:txBody>
+          <a:bodyPr wrap="none" lIns="91440" tIns="45720" rIns="91440" bIns="45720" rtlCol="0">
+            <a:spAutoFit/>
+          </a:bodyPr>
+          <a:lstStyle/>
+          <a:p>
+            <a:r>
+              <a:rPr lang="en-US" sz="1800" dirty="0">
+                <a:solidFill>
+                  <a:srgbClr val="000000"/>
+                </a:solidFill>
+              </a:rPr>
+              <a:t>Space</a:t>
+            </a:r>
+          </a:p>
+        </p:txBody>
+      </p:sp>
+      <p:sp>
+        <p:nvSpPr>
+          <p:cNvPr id="38" name="Line 25"/>
+          <p:cNvSpPr>
+            <a:spLocks noChangeShapeType="1"/>
+          </p:cNvSpPr>
+          <p:nvPr/>
+        </p:nvSpPr>
+        <p:spPr bwMode="auto">
+          <a:xfrm flipV="1">
+            <a:off x="5836175" y="2976173"/>
+            <a:ext cx="122166" cy="407474"/>
+          </a:xfrm>
+          <a:prstGeom prst="line">
+            <a:avLst/>
+          </a:prstGeom>
+          <a:noFill/>
+          <a:ln w="28575">
+            <a:solidFill>
+              <a:schemeClr val="tx1"/>
+            </a:solidFill>
+            <a:round/>
+            <a:headEnd type="none" w="sm" len="sm"/>
+            <a:tailEnd type="triangle" w="med" len="lg"/>
+          </a:ln>
+        </p:spPr>
+        <p:txBody>
+          <a:bodyPr wrap="none" lIns="91440" tIns="45720" rIns="91440" bIns="45720" anchor="ctr"/>
+          <a:lstStyle/>
+          <a:p>
+            <a:endParaRPr lang="en-US" dirty="0">
+              <a:solidFill>
+                <a:srgbClr val="000000"/>
+              </a:solidFill>
+            </a:endParaRPr>
+          </a:p>
+        </p:txBody>
+      </p:sp>
+      <p:sp>
+        <p:nvSpPr>
+          <p:cNvPr id="39" name="Line 25"/>
+          <p:cNvSpPr>
+            <a:spLocks noChangeShapeType="1"/>
+          </p:cNvSpPr>
+          <p:nvPr/>
+        </p:nvSpPr>
+        <p:spPr bwMode="auto">
+          <a:xfrm flipV="1">
+            <a:off x="7353563" y="3553953"/>
+            <a:ext cx="515662" cy="145446"/>
+          </a:xfrm>
+          <a:prstGeom prst="line">
+            <a:avLst/>
+          </a:prstGeom>
+          <a:noFill/>
+          <a:ln w="28575">
+            <a:solidFill>
+              <a:schemeClr val="tx1"/>
+            </a:solidFill>
+            <a:round/>
+            <a:headEnd type="none" w="sm" len="sm"/>
+            <a:tailEnd type="triangle" w="med" len="lg"/>
+          </a:ln>
+        </p:spPr>
+        <p:txBody>
+          <a:bodyPr wrap="none" lIns="91440" tIns="45720" rIns="91440" bIns="45720" anchor="ctr"/>
+          <a:lstStyle/>
+          <a:p>
+            <a:endParaRPr lang="en-US" dirty="0">
+              <a:solidFill>
+                <a:srgbClr val="000000"/>
+              </a:solidFill>
+            </a:endParaRPr>
+          </a:p>
+        </p:txBody>
+      </p:sp>
+      <p:pic>
+        <p:nvPicPr>
+          <p:cNvPr id="40" name="Picture 39" descr="latex-image-1.pdf"/>
+          <p:cNvPicPr>
+            <a:picLocks noChangeAspect="1"/>
+          </p:cNvPicPr>
+          <p:nvPr/>
+        </p:nvPicPr>
+        <p:blipFill>
+          <a:blip r:embed="rId5">
+            <a:extLst>
+              <a:ext uri="{28A0092B-C50C-407E-A947-70E740481C1C}">
+                <a14:useLocalDpi xmlns:a14="http://schemas.microsoft.com/office/drawing/2010/main" val="0"/>
+              </a:ext>
+            </a:extLst>
+          </a:blip>
+          <a:stretch>
+            <a:fillRect/>
+          </a:stretch>
+        </p:blipFill>
+        <p:spPr>
+          <a:xfrm>
+            <a:off x="3675758" y="2547154"/>
+            <a:ext cx="1079500" cy="177800"/>
+          </a:xfrm>
+          <a:prstGeom prst="rect">
+            <a:avLst/>
+          </a:prstGeom>
+        </p:spPr>
+      </p:pic>
+      <p:sp>
+        <p:nvSpPr>
+          <p:cNvPr id="21" name="Text Box 30"/>
+          <p:cNvSpPr txBox="1">
+            <a:spLocks noChangeArrowheads="1"/>
+          </p:cNvSpPr>
+          <p:nvPr/>
+        </p:nvSpPr>
+        <p:spPr bwMode="auto">
+          <a:xfrm>
+            <a:off x="2895021" y="1905769"/>
+            <a:ext cx="2629480" cy="400110"/>
+          </a:xfrm>
+          <a:prstGeom prst="rect">
+            <a:avLst/>
+          </a:prstGeom>
+          <a:noFill/>
+          <a:ln w="12700">
+            <a:noFill/>
+            <a:miter lim="800000"/>
+            <a:headEnd type="none" w="sm" len="sm"/>
+            <a:tailEnd type="none" w="sm" len="sm"/>
+          </a:ln>
+        </p:spPr>
+        <p:txBody>
+          <a:bodyPr wrap="square" lIns="91440" tIns="45720" rIns="91440" bIns="45720">
+            <a:spAutoFit/>
+          </a:bodyPr>
+          <a:lstStyle/>
+          <a:p>
+            <a:pPr algn="ctr">
+              <a:spcBef>
+                <a:spcPct val="0"/>
+              </a:spcBef>
+            </a:pPr>
+            <a:r>
+              <a:rPr lang="en-US" sz="2000" b="1" dirty="0"/>
+              <a:t>Iterate</a:t>
+            </a:r>
+            <a:endParaRPr lang="en-US" sz="2000" dirty="0"/>
+          </a:p>
+        </p:txBody>
+      </p:sp>
+      <p:grpSp>
+        <p:nvGrpSpPr>
+          <p:cNvPr id="45" name="Group 44"/>
+          <p:cNvGrpSpPr>
+            <a:grpSpLocks noChangeAspect="1"/>
+          </p:cNvGrpSpPr>
+          <p:nvPr/>
+        </p:nvGrpSpPr>
+        <p:grpSpPr>
+          <a:xfrm>
+            <a:off x="3627511" y="1841501"/>
+            <a:ext cx="1149324" cy="585602"/>
+            <a:chOff x="5337033" y="4536719"/>
+            <a:chExt cx="709803" cy="406400"/>
+          </a:xfrm>
+        </p:grpSpPr>
+        <p:grpSp>
+          <p:nvGrpSpPr>
+            <p:cNvPr id="47" name="Group 46"/>
+            <p:cNvGrpSpPr/>
+            <p:nvPr/>
+          </p:nvGrpSpPr>
+          <p:grpSpPr>
+            <a:xfrm rot="10800000">
+              <a:off x="5392627" y="4536719"/>
+              <a:ext cx="654209" cy="331613"/>
+              <a:chOff x="5335958" y="4571707"/>
+              <a:chExt cx="654209" cy="457200"/>
+            </a:xfrm>
+          </p:grpSpPr>
+          <p:sp>
+            <p:nvSpPr>
+              <p:cNvPr id="51" name="Arc 50"/>
+              <p:cNvSpPr>
+                <a:spLocks/>
+              </p:cNvSpPr>
+              <p:nvPr/>
+            </p:nvSpPr>
+            <p:spPr>
+              <a:xfrm rot="10800000">
+                <a:off x="5390757" y="4571707"/>
+                <a:ext cx="599410" cy="457200"/>
+              </a:xfrm>
+              <a:prstGeom prst="arc">
+                <a:avLst>
+                  <a:gd name="adj1" fmla="val 11111675"/>
+                  <a:gd name="adj2" fmla="val 0"/>
+                </a:avLst>
+              </a:prstGeom>
+              <a:ln w="38100" cmpd="sng">
+                <a:solidFill>
+                  <a:schemeClr val="tx1"/>
+                </a:solidFill>
+                <a:prstDash val="solid"/>
+                <a:tailEnd type="none"/>
+              </a:ln>
+              <a:effectLst/>
+            </p:spPr>
+            <p:style>
+              <a:lnRef idx="2">
+                <a:schemeClr val="accent1"/>
+              </a:lnRef>
+              <a:fillRef idx="0">
+                <a:schemeClr val="accent1"/>
+              </a:fillRef>
+              <a:effectRef idx="1">
+                <a:schemeClr val="accent1"/>
+              </a:effectRef>
+              <a:fontRef idx="minor">
+                <a:schemeClr val="tx1"/>
+              </a:fontRef>
+            </p:style>
+            <p:txBody>
+              <a:bodyPr rtlCol="0" anchor="ctr"/>
+              <a:lstStyle/>
+              <a:p>
+                <a:pPr algn="ctr"/>
+                <a:endParaRPr lang="en-US" sz="2000"/>
+              </a:p>
+            </p:txBody>
+          </p:sp>
+          <p:sp>
+            <p:nvSpPr>
+              <p:cNvPr id="52" name="Right Triangle 51"/>
+              <p:cNvSpPr>
+                <a:spLocks/>
+              </p:cNvSpPr>
+              <p:nvPr/>
+            </p:nvSpPr>
+            <p:spPr>
+              <a:xfrm rot="8100000">
+                <a:off x="5335958" y="4729039"/>
+                <a:ext cx="106680" cy="151284"/>
+              </a:xfrm>
+              <a:prstGeom prst="rtTriangle">
+                <a:avLst/>
+              </a:prstGeom>
+              <a:solidFill>
+                <a:schemeClr val="tx1"/>
+              </a:solidFill>
+              <a:ln w="63500" cap="rnd" cmpd="sng">
+                <a:noFill/>
+                <a:prstDash val="solid"/>
+                <a:round/>
+                <a:tailEnd type="triangle" w="sm" len="sm"/>
+              </a:ln>
+              <a:effectLst/>
+            </p:spPr>
+            <p:style>
+              <a:lnRef idx="2">
+                <a:schemeClr val="accent1"/>
+              </a:lnRef>
+              <a:fillRef idx="0">
+                <a:schemeClr val="accent1"/>
+              </a:fillRef>
+              <a:effectRef idx="1">
+                <a:schemeClr val="accent1"/>
+              </a:effectRef>
+              <a:fontRef idx="minor">
+                <a:schemeClr val="tx1"/>
+              </a:fontRef>
+            </p:style>
+            <p:txBody>
+              <a:bodyPr rtlCol="0" anchor="ctr"/>
+              <a:lstStyle/>
+              <a:p>
+                <a:pPr algn="ctr"/>
+                <a:endParaRPr lang="en-US" sz="2000">
+                  <a:solidFill>
+                    <a:schemeClr val="tx1"/>
+                  </a:solidFill>
+                </a:endParaRPr>
+              </a:p>
+            </p:txBody>
+          </p:sp>
+        </p:grpSp>
+        <p:grpSp>
+          <p:nvGrpSpPr>
+            <p:cNvPr id="48" name="Group 47"/>
+            <p:cNvGrpSpPr/>
+            <p:nvPr/>
+          </p:nvGrpSpPr>
+          <p:grpSpPr>
+            <a:xfrm>
+              <a:off x="5337033" y="4611506"/>
+              <a:ext cx="655815" cy="331613"/>
+              <a:chOff x="5334352" y="4552251"/>
+              <a:chExt cx="655815" cy="457200"/>
+            </a:xfrm>
+          </p:grpSpPr>
+          <p:sp>
+            <p:nvSpPr>
+              <p:cNvPr id="49" name="Arc 48"/>
+              <p:cNvSpPr>
+                <a:spLocks/>
+              </p:cNvSpPr>
+              <p:nvPr/>
+            </p:nvSpPr>
+            <p:spPr>
+              <a:xfrm rot="10800000">
+                <a:off x="5390757" y="4552251"/>
+                <a:ext cx="599410" cy="457200"/>
+              </a:xfrm>
+              <a:prstGeom prst="arc">
+                <a:avLst>
+                  <a:gd name="adj1" fmla="val 11111675"/>
+                  <a:gd name="adj2" fmla="val 0"/>
+                </a:avLst>
+              </a:prstGeom>
+              <a:ln w="38100" cmpd="sng">
+                <a:solidFill>
+                  <a:schemeClr val="tx1"/>
+                </a:solidFill>
+                <a:prstDash val="solid"/>
+                <a:tailEnd type="none"/>
+              </a:ln>
+              <a:effectLst/>
+            </p:spPr>
+            <p:style>
+              <a:lnRef idx="2">
+                <a:schemeClr val="accent1"/>
+              </a:lnRef>
+              <a:fillRef idx="0">
+                <a:schemeClr val="accent1"/>
+              </a:fillRef>
+              <a:effectRef idx="1">
+                <a:schemeClr val="accent1"/>
+              </a:effectRef>
+              <a:fontRef idx="minor">
+                <a:schemeClr val="tx1"/>
+              </a:fontRef>
+            </p:style>
+            <p:txBody>
+              <a:bodyPr rtlCol="0" anchor="ctr"/>
+              <a:lstStyle/>
+              <a:p>
+                <a:pPr algn="ctr"/>
+                <a:endParaRPr lang="en-US" sz="2000"/>
+              </a:p>
+            </p:txBody>
+          </p:sp>
+          <p:sp>
+            <p:nvSpPr>
+              <p:cNvPr id="50" name="Right Triangle 49"/>
+              <p:cNvSpPr>
+                <a:spLocks/>
+              </p:cNvSpPr>
+              <p:nvPr/>
+            </p:nvSpPr>
+            <p:spPr>
+              <a:xfrm rot="8160000">
+                <a:off x="5334352" y="4708320"/>
+                <a:ext cx="111643" cy="151284"/>
+              </a:xfrm>
+              <a:prstGeom prst="rtTriangle">
+                <a:avLst/>
+              </a:prstGeom>
+              <a:solidFill>
+                <a:schemeClr val="tx1"/>
+              </a:solidFill>
+              <a:ln w="63500" cap="rnd" cmpd="sng">
+                <a:noFill/>
+                <a:prstDash val="solid"/>
+                <a:round/>
+                <a:tailEnd type="triangle" w="sm" len="sm"/>
+              </a:ln>
+              <a:effectLst/>
+            </p:spPr>
+            <p:style>
+              <a:lnRef idx="2">
+                <a:schemeClr val="accent1"/>
+              </a:lnRef>
+              <a:fillRef idx="0">
+                <a:schemeClr val="accent1"/>
+              </a:fillRef>
+              <a:effectRef idx="1">
+                <a:schemeClr val="accent1"/>
+              </a:effectRef>
+              <a:fontRef idx="minor">
+                <a:schemeClr val="tx1"/>
+              </a:fontRef>
+            </p:style>
+            <p:txBody>
+              <a:bodyPr rtlCol="0" anchor="ctr"/>
+              <a:lstStyle/>
+              <a:p>
+                <a:pPr algn="ctr"/>
+                <a:endParaRPr lang="en-US" sz="2000">
+                  <a:solidFill>
+                    <a:schemeClr val="tx1"/>
+                  </a:solidFill>
+                </a:endParaRPr>
+              </a:p>
+            </p:txBody>
+          </p:sp>
+        </p:grpSp>
+      </p:grpSp>
+      <p:sp>
+        <p:nvSpPr>
+          <p:cNvPr id="53" name="Right Arrow 52"/>
+          <p:cNvSpPr/>
+          <p:nvPr/>
+        </p:nvSpPr>
+        <p:spPr>
+          <a:xfrm flipV="1">
+            <a:off x="2739254" y="2114509"/>
+            <a:ext cx="637334" cy="102640"/>
+          </a:xfrm>
+          <a:prstGeom prst="rightArrow">
+            <a:avLst/>
+          </a:prstGeom>
+          <a:solidFill>
+            <a:schemeClr val="tx1"/>
+          </a:solidFill>
+          <a:ln w="63500" cap="rnd" cmpd="sng">
+            <a:solidFill>
+              <a:schemeClr val="tx1"/>
+            </a:solidFill>
+            <a:prstDash val="solid"/>
+            <a:round/>
+            <a:tailEnd type="triangle" w="sm" len="sm"/>
+          </a:ln>
+          <a:effectLst/>
+        </p:spPr>
+        <p:style>
+          <a:lnRef idx="2">
+            <a:schemeClr val="accent1"/>
+          </a:lnRef>
+          <a:fillRef idx="0">
+            <a:schemeClr val="accent1"/>
+          </a:fillRef>
+          <a:effectRef idx="1">
+            <a:schemeClr val="accent1"/>
+          </a:effectRef>
+          <a:fontRef idx="minor">
+            <a:schemeClr val="tx1"/>
+          </a:fontRef>
+        </p:style>
+        <p:txBody>
+          <a:bodyPr rtlCol="0" anchor="ctr"/>
+          <a:lstStyle/>
+          <a:p>
+            <a:pPr algn="ctr"/>
+            <a:endParaRPr lang="en-US" sz="900">
+              <a:solidFill>
+                <a:schemeClr val="tx1"/>
+              </a:solidFill>
+            </a:endParaRPr>
+          </a:p>
+        </p:txBody>
+      </p:sp>
+      <p:sp>
+        <p:nvSpPr>
+          <p:cNvPr id="54" name="Right Arrow 53"/>
+          <p:cNvSpPr/>
+          <p:nvPr/>
+        </p:nvSpPr>
+        <p:spPr>
+          <a:xfrm flipV="1">
+            <a:off x="5476824" y="2118743"/>
+            <a:ext cx="637334" cy="102640"/>
+          </a:xfrm>
+          <a:prstGeom prst="rightArrow">
+            <a:avLst/>
+          </a:prstGeom>
+          <a:solidFill>
+            <a:schemeClr val="tx1"/>
+          </a:solidFill>
+          <a:ln w="63500" cap="rnd" cmpd="sng">
+            <a:solidFill>
+              <a:schemeClr val="tx1"/>
+            </a:solidFill>
+            <a:prstDash val="solid"/>
+            <a:round/>
+            <a:tailEnd type="triangle" w="sm" len="sm"/>
+          </a:ln>
+          <a:effectLst/>
+        </p:spPr>
+        <p:style>
+          <a:lnRef idx="2">
+            <a:schemeClr val="accent1"/>
+          </a:lnRef>
+          <a:fillRef idx="0">
+            <a:schemeClr val="accent1"/>
+          </a:fillRef>
+          <a:effectRef idx="1">
+            <a:schemeClr val="accent1"/>
+          </a:effectRef>
+          <a:fontRef idx="minor">
+            <a:schemeClr val="tx1"/>
+          </a:fontRef>
+        </p:style>
+        <p:txBody>
+          <a:bodyPr rtlCol="0" anchor="ctr"/>
+          <a:lstStyle/>
+          <a:p>
+            <a:pPr algn="ctr"/>
+            <a:endParaRPr lang="en-US" sz="900">
+              <a:solidFill>
+                <a:schemeClr val="tx1"/>
+              </a:solidFill>
+            </a:endParaRPr>
+          </a:p>
+        </p:txBody>
+      </p:sp>
+      <p:sp>
+        <p:nvSpPr>
+          <p:cNvPr id="2" name="Rounded Rectangle 1"/>
+          <p:cNvSpPr/>
+          <p:nvPr/>
+        </p:nvSpPr>
+        <p:spPr>
+          <a:xfrm>
+            <a:off x="2786923" y="2497670"/>
+            <a:ext cx="2751666" cy="1566334"/>
+          </a:xfrm>
+          <a:prstGeom prst="roundRect">
+            <a:avLst/>
+          </a:prstGeom>
+          <a:noFill/>
+          <a:ln w="38100" cap="rnd" cmpd="sng">
+            <a:solidFill>
+              <a:schemeClr val="tx1"/>
+            </a:solidFill>
+            <a:prstDash val="solid"/>
+            <a:round/>
+            <a:tailEnd type="triangle" w="sm" len="sm"/>
+          </a:ln>
+          <a:effectLst/>
+        </p:spPr>
+        <p:style>
+          <a:lnRef idx="2">
+            <a:schemeClr val="accent1"/>
+          </a:lnRef>
+          <a:fillRef idx="0">
+            <a:schemeClr val="accent1"/>
+          </a:fillRef>
+          <a:effectRef idx="1">
+            <a:schemeClr val="accent1"/>
+          </a:effectRef>
+          <a:fontRef idx="minor">
+            <a:schemeClr val="tx1"/>
+          </a:fontRef>
+        </p:style>
+        <p:txBody>
+          <a:bodyPr rtlCol="0" anchor="ctr"/>
+          <a:lstStyle/>
+          <a:p>
+            <a:pPr algn="ctr"/>
+            <a:endParaRPr lang="en-US">
+              <a:solidFill>
+                <a:schemeClr val="tx1"/>
+              </a:solidFill>
+            </a:endParaRPr>
+          </a:p>
+        </p:txBody>
+      </p:sp>
+      <p:sp>
+        <p:nvSpPr>
+          <p:cNvPr id="55" name="Rounded Rectangle 54"/>
+          <p:cNvSpPr/>
+          <p:nvPr/>
+        </p:nvSpPr>
+        <p:spPr>
+          <a:xfrm>
+            <a:off x="5535751" y="2494846"/>
+            <a:ext cx="2751666" cy="1566334"/>
+          </a:xfrm>
+          <a:prstGeom prst="roundRect">
+            <a:avLst/>
+          </a:prstGeom>
+          <a:noFill/>
+          <a:ln w="38100" cap="rnd" cmpd="sng">
+            <a:solidFill>
+              <a:schemeClr val="tx1"/>
+            </a:solidFill>
+            <a:prstDash val="solid"/>
+            <a:round/>
+            <a:tailEnd type="triangle" w="sm" len="sm"/>
+          </a:ln>
+          <a:effectLst/>
+        </p:spPr>
+        <p:style>
+          <a:lnRef idx="2">
+            <a:schemeClr val="accent1"/>
+          </a:lnRef>
+          <a:fillRef idx="0">
+            <a:schemeClr val="accent1"/>
+          </a:fillRef>
+          <a:effectRef idx="1">
+            <a:schemeClr val="accent1"/>
+          </a:effectRef>
+          <a:fontRef idx="minor">
+            <a:schemeClr val="tx1"/>
+          </a:fontRef>
+        </p:style>
+        <p:txBody>
+          <a:bodyPr rtlCol="0" anchor="ctr"/>
+          <a:lstStyle/>
+          <a:p>
+            <a:pPr algn="ctr"/>
+            <a:endParaRPr lang="en-US">
+              <a:solidFill>
+                <a:schemeClr val="tx1"/>
+              </a:solidFill>
+            </a:endParaRPr>
+          </a:p>
+        </p:txBody>
+      </p:sp>
+      <p:sp>
+        <p:nvSpPr>
+          <p:cNvPr id="56" name="Rounded Rectangle 55"/>
+          <p:cNvSpPr/>
+          <p:nvPr/>
+        </p:nvSpPr>
+        <p:spPr>
+          <a:xfrm>
+            <a:off x="35280" y="2492028"/>
+            <a:ext cx="2751666" cy="1566334"/>
+          </a:xfrm>
+          <a:prstGeom prst="roundRect">
+            <a:avLst/>
+          </a:prstGeom>
+          <a:noFill/>
+          <a:ln w="38100" cap="rnd" cmpd="sng">
+            <a:solidFill>
+              <a:schemeClr val="tx1"/>
+            </a:solidFill>
+            <a:prstDash val="solid"/>
+            <a:round/>
+            <a:tailEnd type="triangle" w="sm" len="sm"/>
+          </a:ln>
+          <a:effectLst/>
+        </p:spPr>
+        <p:style>
+          <a:lnRef idx="2">
+            <a:schemeClr val="accent1"/>
+          </a:lnRef>
+          <a:fillRef idx="0">
+            <a:schemeClr val="accent1"/>
+          </a:fillRef>
+          <a:effectRef idx="1">
+            <a:schemeClr val="accent1"/>
+          </a:effectRef>
+          <a:fontRef idx="minor">
+            <a:schemeClr val="tx1"/>
+          </a:fontRef>
+        </p:style>
+        <p:txBody>
+          <a:bodyPr rtlCol="0" anchor="ctr"/>
+          <a:lstStyle/>
+          <a:p>
+            <a:pPr algn="ctr"/>
+            <a:endParaRPr lang="en-US">
+              <a:solidFill>
+                <a:schemeClr val="tx1"/>
+              </a:solidFill>
+            </a:endParaRPr>
+          </a:p>
+        </p:txBody>
+      </p:sp>
+    </p:spTree>
+    <p:extLst>
+      <p:ext uri="{BB962C8B-B14F-4D97-AF65-F5344CB8AC3E}">
+        <p14:creationId xmlns:p14="http://schemas.microsoft.com/office/powerpoint/2010/main" val="533794142"/>
+      </p:ext>
+    </p:extLst>
+  </p:cSld>
+  <p:clrMapOvr>
+    <a:masterClrMapping/>
+  </p:clrMapOvr>
+</p:sld>
+</file>
+
+<file path=ppt/slides/slide3.xml><?xml version="1.0" encoding="utf-8"?>
+<p:sld xmlns:a="http://schemas.openxmlformats.org/drawingml/2006/main" xmlns:r="http://schemas.openxmlformats.org/officeDocument/2006/relationships" xmlns:p="http://schemas.openxmlformats.org/presentationml/2006/main">
+  <p:cSld>
+    <p:spTree>
+      <p:nvGrpSpPr>
+        <p:cNvPr id="1" name=""/>
+        <p:cNvGrpSpPr/>
+        <p:nvPr/>
+      </p:nvGrpSpPr>
+      <p:grpSpPr>
+        <a:xfrm>
+          <a:off x="0" y="0"/>
+          <a:ext cx="0" cy="0"/>
+          <a:chOff x="0" y="0"/>
+          <a:chExt cx="0" cy="0"/>
+        </a:xfrm>
+      </p:grpSpPr>
       <p:grpSp>
         <p:nvGrpSpPr>
           <p:cNvPr id="50" name="Group 49"/>
@@ -7693,98 +9327,6 @@
     <p:extLst>
       <p:ext uri="{BB962C8B-B14F-4D97-AF65-F5344CB8AC3E}">
         <p14:creationId xmlns:p14="http://schemas.microsoft.com/office/powerpoint/2010/main" val="1416242583"/>
-      </p:ext>
-    </p:extLst>
-  </p:cSld>
-  <p:clrMapOvr>
-    <a:masterClrMapping/>
-  </p:clrMapOvr>
-</p:sld>
-</file>
-
-<file path=ppt/slides/slide3.xml><?xml version="1.0" encoding="utf-8"?>
-<p:sld xmlns:a="http://schemas.openxmlformats.org/drawingml/2006/main" xmlns:r="http://schemas.openxmlformats.org/officeDocument/2006/relationships" xmlns:p="http://schemas.openxmlformats.org/presentationml/2006/main">
-  <p:cSld>
-    <p:spTree>
-      <p:nvGrpSpPr>
-        <p:cNvPr id="1" name=""/>
-        <p:cNvGrpSpPr/>
-        <p:nvPr/>
-      </p:nvGrpSpPr>
-      <p:grpSpPr>
-        <a:xfrm>
-          <a:off x="0" y="0"/>
-          <a:ext cx="0" cy="0"/>
-          <a:chOff x="0" y="0"/>
-          <a:chExt cx="0" cy="0"/>
-        </a:xfrm>
-      </p:grpSpPr>
-      <p:sp>
-        <p:nvSpPr>
-          <p:cNvPr id="3" name="Content Placeholder 2"/>
-          <p:cNvSpPr>
-            <a:spLocks noGrp="1"/>
-          </p:cNvSpPr>
-          <p:nvPr>
-            <p:ph idx="1"/>
-          </p:nvPr>
-        </p:nvSpPr>
-        <p:spPr>
-          <a:xfrm>
-            <a:off x="457200" y="469120"/>
-            <a:ext cx="8229600" cy="720840"/>
-          </a:xfrm>
-        </p:spPr>
-        <p:txBody>
-          <a:bodyPr>
-            <a:normAutofit/>
-          </a:bodyPr>
-          <a:lstStyle/>
-          <a:p>
-            <a:pPr marL="0" indent="0">
-              <a:buNone/>
-            </a:pPr>
-            <a:r>
-              <a:rPr lang="en-US" sz="2400" dirty="0" smtClean="0"/>
-              <a:t>Typesetting the name in documents, and in the logo</a:t>
-            </a:r>
-          </a:p>
-        </p:txBody>
-      </p:sp>
-      <p:pic>
-        <p:nvPicPr>
-          <p:cNvPr id="4" name="Picture 3" descr="latex-image-1.pdf"/>
-          <p:cNvPicPr>
-            <a:picLocks noChangeAspect="1"/>
-          </p:cNvPicPr>
-          <p:nvPr/>
-        </p:nvPicPr>
-        <p:blipFill>
-          <a:blip r:embed="rId2">
-            <a:extLst>
-              <a:ext uri="{28A0092B-C50C-407E-A947-70E740481C1C}">
-                <a14:useLocalDpi xmlns:a14="http://schemas.microsoft.com/office/drawing/2010/main" val="0"/>
-              </a:ext>
-            </a:extLst>
-          </a:blip>
-          <a:stretch>
-            <a:fillRect/>
-          </a:stretch>
-        </p:blipFill>
-        <p:spPr>
-          <a:xfrm>
-            <a:off x="559175" y="1189960"/>
-            <a:ext cx="6731000" cy="1447800"/>
-          </a:xfrm>
-          <a:prstGeom prst="rect">
-            <a:avLst/>
-          </a:prstGeom>
-        </p:spPr>
-      </p:pic>
-    </p:spTree>
-    <p:extLst>
-      <p:ext uri="{BB962C8B-B14F-4D97-AF65-F5344CB8AC3E}">
-        <p14:creationId xmlns:p14="http://schemas.microsoft.com/office/powerpoint/2010/main" val="4187172655"/>
       </p:ext>
     </p:extLst>
   </p:cSld>

</xml_diff>